<commit_message>
Ajout : Roadmap visuelle
</commit_message>
<xml_diff>
--- a/Roadmap_fonctionelle.pptx
+++ b/Roadmap_fonctionelle.pptx
@@ -259,7 +259,7 @@
           <a:p>
             <a:fld id="{D356DBBF-99BB-4DFC-AC32-3C1C8851FADE}" type="datetimeFigureOut">
               <a:rPr lang="fr-FR" smtClean="0"/>
-              <a:t>18/02/2022</a:t>
+              <a:t>19/02/2022</a:t>
             </a:fld>
             <a:endParaRPr lang="fr-FR"/>
           </a:p>
@@ -457,7 +457,7 @@
           <a:p>
             <a:fld id="{D356DBBF-99BB-4DFC-AC32-3C1C8851FADE}" type="datetimeFigureOut">
               <a:rPr lang="fr-FR" smtClean="0"/>
-              <a:t>18/02/2022</a:t>
+              <a:t>19/02/2022</a:t>
             </a:fld>
             <a:endParaRPr lang="fr-FR"/>
           </a:p>
@@ -665,7 +665,7 @@
           <a:p>
             <a:fld id="{D356DBBF-99BB-4DFC-AC32-3C1C8851FADE}" type="datetimeFigureOut">
               <a:rPr lang="fr-FR" smtClean="0"/>
-              <a:t>18/02/2022</a:t>
+              <a:t>19/02/2022</a:t>
             </a:fld>
             <a:endParaRPr lang="fr-FR"/>
           </a:p>
@@ -863,7 +863,7 @@
           <a:p>
             <a:fld id="{D356DBBF-99BB-4DFC-AC32-3C1C8851FADE}" type="datetimeFigureOut">
               <a:rPr lang="fr-FR" smtClean="0"/>
-              <a:t>18/02/2022</a:t>
+              <a:t>19/02/2022</a:t>
             </a:fld>
             <a:endParaRPr lang="fr-FR"/>
           </a:p>
@@ -1138,7 +1138,7 @@
           <a:p>
             <a:fld id="{D356DBBF-99BB-4DFC-AC32-3C1C8851FADE}" type="datetimeFigureOut">
               <a:rPr lang="fr-FR" smtClean="0"/>
-              <a:t>18/02/2022</a:t>
+              <a:t>19/02/2022</a:t>
             </a:fld>
             <a:endParaRPr lang="fr-FR"/>
           </a:p>
@@ -1403,7 +1403,7 @@
           <a:p>
             <a:fld id="{D356DBBF-99BB-4DFC-AC32-3C1C8851FADE}" type="datetimeFigureOut">
               <a:rPr lang="fr-FR" smtClean="0"/>
-              <a:t>18/02/2022</a:t>
+              <a:t>19/02/2022</a:t>
             </a:fld>
             <a:endParaRPr lang="fr-FR"/>
           </a:p>
@@ -1815,7 +1815,7 @@
           <a:p>
             <a:fld id="{D356DBBF-99BB-4DFC-AC32-3C1C8851FADE}" type="datetimeFigureOut">
               <a:rPr lang="fr-FR" smtClean="0"/>
-              <a:t>18/02/2022</a:t>
+              <a:t>19/02/2022</a:t>
             </a:fld>
             <a:endParaRPr lang="fr-FR"/>
           </a:p>
@@ -1956,7 +1956,7 @@
           <a:p>
             <a:fld id="{D356DBBF-99BB-4DFC-AC32-3C1C8851FADE}" type="datetimeFigureOut">
               <a:rPr lang="fr-FR" smtClean="0"/>
-              <a:t>18/02/2022</a:t>
+              <a:t>19/02/2022</a:t>
             </a:fld>
             <a:endParaRPr lang="fr-FR"/>
           </a:p>
@@ -2069,7 +2069,7 @@
           <a:p>
             <a:fld id="{D356DBBF-99BB-4DFC-AC32-3C1C8851FADE}" type="datetimeFigureOut">
               <a:rPr lang="fr-FR" smtClean="0"/>
-              <a:t>18/02/2022</a:t>
+              <a:t>19/02/2022</a:t>
             </a:fld>
             <a:endParaRPr lang="fr-FR"/>
           </a:p>
@@ -2380,7 +2380,7 @@
           <a:p>
             <a:fld id="{D356DBBF-99BB-4DFC-AC32-3C1C8851FADE}" type="datetimeFigureOut">
               <a:rPr lang="fr-FR" smtClean="0"/>
-              <a:t>18/02/2022</a:t>
+              <a:t>19/02/2022</a:t>
             </a:fld>
             <a:endParaRPr lang="fr-FR"/>
           </a:p>
@@ -2668,7 +2668,7 @@
           <a:p>
             <a:fld id="{D356DBBF-99BB-4DFC-AC32-3C1C8851FADE}" type="datetimeFigureOut">
               <a:rPr lang="fr-FR" smtClean="0"/>
-              <a:t>18/02/2022</a:t>
+              <a:t>19/02/2022</a:t>
             </a:fld>
             <a:endParaRPr lang="fr-FR"/>
           </a:p>
@@ -2909,7 +2909,7 @@
           <a:p>
             <a:fld id="{D356DBBF-99BB-4DFC-AC32-3C1C8851FADE}" type="datetimeFigureOut">
               <a:rPr lang="fr-FR" smtClean="0"/>
-              <a:t>18/02/2022</a:t>
+              <a:t>19/02/2022</a:t>
             </a:fld>
             <a:endParaRPr lang="fr-FR"/>
           </a:p>
@@ -3328,10 +3328,10 @@
       </p:grpSpPr>
       <p:cxnSp>
         <p:nvCxnSpPr>
-          <p:cNvPr id="125" name="Connecteur droit 124">
-            <a:extLst>
-              <a:ext uri="{FF2B5EF4-FFF2-40B4-BE49-F238E27FC236}">
-                <a16:creationId xmlns:a16="http://schemas.microsoft.com/office/drawing/2014/main" id="{19E24F6E-BFEA-4D24-A498-BCB45435010A}"/>
+          <p:cNvPr id="103" name="Connecteur droit 102">
+            <a:extLst>
+              <a:ext uri="{FF2B5EF4-FFF2-40B4-BE49-F238E27FC236}">
+                <a16:creationId xmlns:a16="http://schemas.microsoft.com/office/drawing/2014/main" id="{4DDC321E-BAFA-44AE-8A43-54262E9A3224}"/>
               </a:ext>
             </a:extLst>
           </p:cNvPr>
@@ -3342,8 +3342,243 @@
         </p:nvCxnSpPr>
         <p:spPr>
           <a:xfrm>
-            <a:off x="8101133" y="507329"/>
-            <a:ext cx="0" cy="5349019"/>
+            <a:off x="2765474" y="933374"/>
+            <a:ext cx="0" cy="5017754"/>
+          </a:xfrm>
+          <a:prstGeom prst="line">
+            <a:avLst/>
+          </a:prstGeom>
+          <a:ln>
+            <a:solidFill>
+              <a:schemeClr val="bg2">
+                <a:lumMod val="90000"/>
+                <a:alpha val="65000"/>
+              </a:schemeClr>
+            </a:solidFill>
+            <a:prstDash val="dash"/>
+          </a:ln>
+        </p:spPr>
+        <p:style>
+          <a:lnRef idx="1">
+            <a:schemeClr val="dk1"/>
+          </a:lnRef>
+          <a:fillRef idx="0">
+            <a:schemeClr val="dk1"/>
+          </a:fillRef>
+          <a:effectRef idx="0">
+            <a:schemeClr val="dk1"/>
+          </a:effectRef>
+          <a:fontRef idx="minor">
+            <a:schemeClr val="tx1"/>
+          </a:fontRef>
+        </p:style>
+      </p:cxnSp>
+      <p:cxnSp>
+        <p:nvCxnSpPr>
+          <p:cNvPr id="109" name="Connecteur droit 108">
+            <a:extLst>
+              <a:ext uri="{FF2B5EF4-FFF2-40B4-BE49-F238E27FC236}">
+                <a16:creationId xmlns:a16="http://schemas.microsoft.com/office/drawing/2014/main" id="{1C903939-EC9F-4244-96F9-2199E45F04F0}"/>
+              </a:ext>
+            </a:extLst>
+          </p:cNvPr>
+          <p:cNvCxnSpPr>
+            <a:cxnSpLocks/>
+          </p:cNvCxnSpPr>
+          <p:nvPr/>
+        </p:nvCxnSpPr>
+        <p:spPr>
+          <a:xfrm>
+            <a:off x="4390861" y="933374"/>
+            <a:ext cx="0" cy="5056519"/>
+          </a:xfrm>
+          <a:prstGeom prst="line">
+            <a:avLst/>
+          </a:prstGeom>
+          <a:ln>
+            <a:solidFill>
+              <a:schemeClr val="bg2">
+                <a:lumMod val="90000"/>
+                <a:alpha val="65000"/>
+              </a:schemeClr>
+            </a:solidFill>
+            <a:prstDash val="dash"/>
+          </a:ln>
+        </p:spPr>
+        <p:style>
+          <a:lnRef idx="1">
+            <a:schemeClr val="dk1"/>
+          </a:lnRef>
+          <a:fillRef idx="0">
+            <a:schemeClr val="dk1"/>
+          </a:fillRef>
+          <a:effectRef idx="0">
+            <a:schemeClr val="dk1"/>
+          </a:effectRef>
+          <a:fontRef idx="minor">
+            <a:schemeClr val="tx1"/>
+          </a:fontRef>
+        </p:style>
+      </p:cxnSp>
+      <p:cxnSp>
+        <p:nvCxnSpPr>
+          <p:cNvPr id="104" name="Connecteur droit 103">
+            <a:extLst>
+              <a:ext uri="{FF2B5EF4-FFF2-40B4-BE49-F238E27FC236}">
+                <a16:creationId xmlns:a16="http://schemas.microsoft.com/office/drawing/2014/main" id="{69AF8DD6-0E11-4F35-9822-0B64CD3CD9A9}"/>
+              </a:ext>
+            </a:extLst>
+          </p:cNvPr>
+          <p:cNvCxnSpPr>
+            <a:cxnSpLocks/>
+          </p:cNvCxnSpPr>
+          <p:nvPr/>
+        </p:nvCxnSpPr>
+        <p:spPr>
+          <a:xfrm>
+            <a:off x="6149286" y="933374"/>
+            <a:ext cx="0" cy="5144834"/>
+          </a:xfrm>
+          <a:prstGeom prst="line">
+            <a:avLst/>
+          </a:prstGeom>
+          <a:ln>
+            <a:solidFill>
+              <a:schemeClr val="bg2">
+                <a:lumMod val="90000"/>
+                <a:alpha val="65000"/>
+              </a:schemeClr>
+            </a:solidFill>
+            <a:prstDash val="dash"/>
+          </a:ln>
+        </p:spPr>
+        <p:style>
+          <a:lnRef idx="1">
+            <a:schemeClr val="dk1"/>
+          </a:lnRef>
+          <a:fillRef idx="0">
+            <a:schemeClr val="dk1"/>
+          </a:fillRef>
+          <a:effectRef idx="0">
+            <a:schemeClr val="dk1"/>
+          </a:effectRef>
+          <a:fontRef idx="minor">
+            <a:schemeClr val="tx1"/>
+          </a:fontRef>
+        </p:style>
+      </p:cxnSp>
+      <p:cxnSp>
+        <p:nvCxnSpPr>
+          <p:cNvPr id="111" name="Connecteur droit 110">
+            <a:extLst>
+              <a:ext uri="{FF2B5EF4-FFF2-40B4-BE49-F238E27FC236}">
+                <a16:creationId xmlns:a16="http://schemas.microsoft.com/office/drawing/2014/main" id="{1D9A3AB9-6447-452A-BE2D-9C23F6BD62FC}"/>
+              </a:ext>
+            </a:extLst>
+          </p:cNvPr>
+          <p:cNvCxnSpPr>
+            <a:cxnSpLocks/>
+          </p:cNvCxnSpPr>
+          <p:nvPr/>
+        </p:nvCxnSpPr>
+        <p:spPr>
+          <a:xfrm>
+            <a:off x="7864529" y="933374"/>
+            <a:ext cx="0" cy="5099609"/>
+          </a:xfrm>
+          <a:prstGeom prst="line">
+            <a:avLst/>
+          </a:prstGeom>
+          <a:ln>
+            <a:solidFill>
+              <a:schemeClr val="bg2">
+                <a:lumMod val="90000"/>
+                <a:alpha val="65000"/>
+              </a:schemeClr>
+            </a:solidFill>
+            <a:prstDash val="dash"/>
+          </a:ln>
+        </p:spPr>
+        <p:style>
+          <a:lnRef idx="1">
+            <a:schemeClr val="dk1"/>
+          </a:lnRef>
+          <a:fillRef idx="0">
+            <a:schemeClr val="dk1"/>
+          </a:fillRef>
+          <a:effectRef idx="0">
+            <a:schemeClr val="dk1"/>
+          </a:effectRef>
+          <a:fontRef idx="minor">
+            <a:schemeClr val="tx1"/>
+          </a:fontRef>
+        </p:style>
+      </p:cxnSp>
+      <p:cxnSp>
+        <p:nvCxnSpPr>
+          <p:cNvPr id="108" name="Connecteur droit 107">
+            <a:extLst>
+              <a:ext uri="{FF2B5EF4-FFF2-40B4-BE49-F238E27FC236}">
+                <a16:creationId xmlns:a16="http://schemas.microsoft.com/office/drawing/2014/main" id="{96C6B9A8-A360-43CC-9545-534BF8EFA76C}"/>
+              </a:ext>
+            </a:extLst>
+          </p:cNvPr>
+          <p:cNvCxnSpPr>
+            <a:cxnSpLocks/>
+          </p:cNvCxnSpPr>
+          <p:nvPr/>
+        </p:nvCxnSpPr>
+        <p:spPr>
+          <a:xfrm>
+            <a:off x="9561357" y="933374"/>
+            <a:ext cx="0" cy="5099609"/>
+          </a:xfrm>
+          <a:prstGeom prst="line">
+            <a:avLst/>
+          </a:prstGeom>
+          <a:ln>
+            <a:solidFill>
+              <a:schemeClr val="bg2">
+                <a:lumMod val="90000"/>
+                <a:alpha val="65000"/>
+              </a:schemeClr>
+            </a:solidFill>
+            <a:prstDash val="dash"/>
+          </a:ln>
+        </p:spPr>
+        <p:style>
+          <a:lnRef idx="1">
+            <a:schemeClr val="dk1"/>
+          </a:lnRef>
+          <a:fillRef idx="0">
+            <a:schemeClr val="dk1"/>
+          </a:fillRef>
+          <a:effectRef idx="0">
+            <a:schemeClr val="dk1"/>
+          </a:effectRef>
+          <a:fontRef idx="minor">
+            <a:schemeClr val="tx1"/>
+          </a:fontRef>
+        </p:style>
+      </p:cxnSp>
+      <p:cxnSp>
+        <p:nvCxnSpPr>
+          <p:cNvPr id="125" name="Connecteur droit 124">
+            <a:extLst>
+              <a:ext uri="{FF2B5EF4-FFF2-40B4-BE49-F238E27FC236}">
+                <a16:creationId xmlns:a16="http://schemas.microsoft.com/office/drawing/2014/main" id="{19E24F6E-BFEA-4D24-A498-BCB45435010A}"/>
+              </a:ext>
+            </a:extLst>
+          </p:cNvPr>
+          <p:cNvCxnSpPr>
+            <a:cxnSpLocks/>
+          </p:cNvCxnSpPr>
+          <p:nvPr/>
+        </p:nvCxnSpPr>
+        <p:spPr>
+          <a:xfrm>
+            <a:off x="6963530" y="933374"/>
+            <a:ext cx="0" cy="4922974"/>
           </a:xfrm>
           <a:prstGeom prst="line">
             <a:avLst/>
@@ -3388,8 +3623,8 @@
         </p:nvCxnSpPr>
         <p:spPr>
           <a:xfrm>
-            <a:off x="10375601" y="507328"/>
-            <a:ext cx="0" cy="5188047"/>
+            <a:off x="10375601" y="933374"/>
+            <a:ext cx="0" cy="4762001"/>
           </a:xfrm>
           <a:prstGeom prst="line">
             <a:avLst/>
@@ -3498,53 +3733,6 @@
           </a:p>
         </p:txBody>
       </p:sp>
-      <p:cxnSp>
-        <p:nvCxnSpPr>
-          <p:cNvPr id="109" name="Connecteur droit 108">
-            <a:extLst>
-              <a:ext uri="{FF2B5EF4-FFF2-40B4-BE49-F238E27FC236}">
-                <a16:creationId xmlns:a16="http://schemas.microsoft.com/office/drawing/2014/main" id="{1C903939-EC9F-4244-96F9-2199E45F04F0}"/>
-              </a:ext>
-            </a:extLst>
-          </p:cNvPr>
-          <p:cNvCxnSpPr>
-            <a:cxnSpLocks/>
-          </p:cNvCxnSpPr>
-          <p:nvPr/>
-        </p:nvCxnSpPr>
-        <p:spPr>
-          <a:xfrm>
-            <a:off x="5022916" y="507328"/>
-            <a:ext cx="0" cy="5482565"/>
-          </a:xfrm>
-          <a:prstGeom prst="line">
-            <a:avLst/>
-          </a:prstGeom>
-          <a:ln>
-            <a:solidFill>
-              <a:schemeClr val="bg2">
-                <a:lumMod val="90000"/>
-                <a:alpha val="65000"/>
-              </a:schemeClr>
-            </a:solidFill>
-            <a:prstDash val="dash"/>
-          </a:ln>
-        </p:spPr>
-        <p:style>
-          <a:lnRef idx="1">
-            <a:schemeClr val="dk1"/>
-          </a:lnRef>
-          <a:fillRef idx="0">
-            <a:schemeClr val="dk1"/>
-          </a:fillRef>
-          <a:effectRef idx="0">
-            <a:schemeClr val="dk1"/>
-          </a:effectRef>
-          <a:fontRef idx="minor">
-            <a:schemeClr val="tx1"/>
-          </a:fontRef>
-        </p:style>
-      </p:cxnSp>
       <p:sp>
         <p:nvSpPr>
           <p:cNvPr id="9" name="OTLSHAPE_TB_00000000000000000000000000000000_TimescaleInterval1">
@@ -3697,7 +3885,7 @@
         </p:nvSpPr>
         <p:spPr>
           <a:xfrm>
-            <a:off x="4946717" y="5922395"/>
+            <a:off x="4314662" y="5922395"/>
             <a:ext cx="152400" cy="177800"/>
           </a:xfrm>
           <a:prstGeom prst="roundRect">
@@ -3764,7 +3952,7 @@
         </p:nvSpPr>
         <p:spPr>
           <a:xfrm>
-            <a:off x="8872231" y="5931399"/>
+            <a:off x="7783567" y="5931399"/>
             <a:ext cx="152400" cy="177800"/>
           </a:xfrm>
           <a:prstGeom prst="roundRect">
@@ -4055,7 +4243,7 @@
         </p:nvCxnSpPr>
         <p:spPr>
           <a:xfrm>
-            <a:off x="795789" y="4306673"/>
+            <a:off x="795789" y="4849598"/>
             <a:ext cx="415346" cy="0"/>
           </a:xfrm>
           <a:prstGeom prst="line">
@@ -4104,8 +4292,8 @@
         </p:nvSpPr>
         <p:spPr>
           <a:xfrm>
-            <a:off x="1195895" y="4243173"/>
-            <a:ext cx="1090800" cy="127000"/>
+            <a:off x="1181654" y="4783850"/>
+            <a:ext cx="756000" cy="127000"/>
           </a:xfrm>
           <a:prstGeom prst="roundRect">
             <a:avLst/>
@@ -4151,7 +4339,7 @@
           <a:lstStyle/>
           <a:p>
             <a:pPr algn="ctr"/>
-            <a:endParaRPr lang="en-US"/>
+            <a:endParaRPr lang="en-US" dirty="0"/>
           </a:p>
         </p:txBody>
       </p:sp>
@@ -4173,7 +4361,7 @@
         </p:nvSpPr>
         <p:spPr>
           <a:xfrm>
-            <a:off x="264742" y="4092569"/>
+            <a:off x="264742" y="4633246"/>
             <a:ext cx="1091618" cy="519506"/>
           </a:xfrm>
           <a:prstGeom prst="rect">
@@ -4246,7 +4434,7 @@
         </p:nvSpPr>
         <p:spPr>
           <a:xfrm>
-            <a:off x="4865822" y="6100195"/>
+            <a:off x="4233767" y="6100195"/>
             <a:ext cx="314189" cy="186055"/>
           </a:xfrm>
           <a:prstGeom prst="rect">
@@ -4291,7 +4479,7 @@
         </p:nvSpPr>
         <p:spPr>
           <a:xfrm>
-            <a:off x="8791336" y="6123742"/>
+            <a:off x="7702672" y="6123742"/>
             <a:ext cx="314189" cy="186055"/>
           </a:xfrm>
           <a:prstGeom prst="rect">
@@ -4335,7 +4523,7 @@
         </p:nvSpPr>
         <p:spPr>
           <a:xfrm>
-            <a:off x="2387922" y="4225739"/>
+            <a:off x="2013854" y="4766416"/>
             <a:ext cx="904994" cy="153888"/>
           </a:xfrm>
           <a:prstGeom prst="rect">
@@ -4418,8 +4606,8 @@
         </p:nvCxnSpPr>
         <p:spPr>
           <a:xfrm>
-            <a:off x="795789" y="3891576"/>
-            <a:ext cx="616106" cy="0"/>
+            <a:off x="831768" y="4373704"/>
+            <a:ext cx="1110370" cy="0"/>
           </a:xfrm>
           <a:prstGeom prst="line">
             <a:avLst/>
@@ -4467,8 +4655,8 @@
         </p:nvSpPr>
         <p:spPr>
           <a:xfrm>
-            <a:off x="1411895" y="3828076"/>
-            <a:ext cx="1054800" cy="127000"/>
+            <a:off x="1942138" y="4310204"/>
+            <a:ext cx="864000" cy="127000"/>
           </a:xfrm>
           <a:prstGeom prst="roundRect">
             <a:avLst/>
@@ -4536,7 +4724,7 @@
         </p:nvSpPr>
         <p:spPr>
           <a:xfrm>
-            <a:off x="264742" y="3681461"/>
+            <a:off x="264742" y="4163589"/>
             <a:ext cx="1178008" cy="519506"/>
           </a:xfrm>
           <a:prstGeom prst="rect">
@@ -4609,7 +4797,7 @@
         </p:nvSpPr>
         <p:spPr>
           <a:xfrm>
-            <a:off x="2524171" y="3814631"/>
+            <a:off x="2886120" y="4296759"/>
             <a:ext cx="945709" cy="153888"/>
           </a:xfrm>
           <a:prstGeom prst="rect">
@@ -4686,7 +4874,7 @@
         </p:nvSpPr>
         <p:spPr>
           <a:xfrm>
-            <a:off x="264742" y="3367898"/>
+            <a:off x="264742" y="3717253"/>
             <a:ext cx="1265637" cy="519506"/>
           </a:xfrm>
           <a:prstGeom prst="rect">
@@ -4773,7 +4961,7 @@
         </p:nvSpPr>
         <p:spPr>
           <a:xfrm>
-            <a:off x="3376680" y="3424871"/>
+            <a:off x="3576344" y="3774226"/>
             <a:ext cx="980562" cy="153888"/>
           </a:xfrm>
           <a:prstGeom prst="rect">
@@ -4850,7 +5038,7 @@
         </p:nvSpPr>
         <p:spPr>
           <a:xfrm>
-            <a:off x="264742" y="2900568"/>
+            <a:off x="264742" y="3199051"/>
             <a:ext cx="1387889" cy="519506"/>
           </a:xfrm>
           <a:prstGeom prst="rect">
@@ -4923,7 +5111,7 @@
         </p:nvSpPr>
         <p:spPr>
           <a:xfrm>
-            <a:off x="3531685" y="3033739"/>
+            <a:off x="4131440" y="3332222"/>
             <a:ext cx="836641" cy="153888"/>
           </a:xfrm>
           <a:prstGeom prst="rect">
@@ -4991,7 +5179,7 @@
         </p:nvSpPr>
         <p:spPr>
           <a:xfrm>
-            <a:off x="264742" y="2500950"/>
+            <a:off x="264742" y="2742015"/>
             <a:ext cx="1296233" cy="519506"/>
           </a:xfrm>
           <a:prstGeom prst="rect">
@@ -5064,7 +5252,7 @@
         </p:nvSpPr>
         <p:spPr>
           <a:xfrm>
-            <a:off x="264742" y="2072973"/>
+            <a:off x="264742" y="2324811"/>
             <a:ext cx="1265637" cy="519506"/>
           </a:xfrm>
           <a:prstGeom prst="rect">
@@ -5137,7 +5325,7 @@
         </p:nvSpPr>
         <p:spPr>
           <a:xfrm>
-            <a:off x="4747932" y="2206144"/>
+            <a:off x="5344670" y="2457982"/>
             <a:ext cx="836641" cy="153888"/>
           </a:xfrm>
           <a:prstGeom prst="rect">
@@ -5205,7 +5393,7 @@
         </p:nvSpPr>
         <p:spPr>
           <a:xfrm>
-            <a:off x="264742" y="1663968"/>
+            <a:off x="264742" y="1864160"/>
             <a:ext cx="2060268" cy="519506"/>
           </a:xfrm>
           <a:prstGeom prst="rect">
@@ -5278,7 +5466,7 @@
         </p:nvSpPr>
         <p:spPr>
           <a:xfrm>
-            <a:off x="5101663" y="1797139"/>
+            <a:off x="5661370" y="1986035"/>
             <a:ext cx="864000" cy="153888"/>
           </a:xfrm>
           <a:prstGeom prst="rect">
@@ -5346,7 +5534,7 @@
         </p:nvSpPr>
         <p:spPr>
           <a:xfrm>
-            <a:off x="264742" y="1286869"/>
+            <a:off x="264742" y="1445378"/>
             <a:ext cx="1666253" cy="519506"/>
           </a:xfrm>
           <a:prstGeom prst="rect">
@@ -5442,7 +5630,7 @@
         </p:nvSpPr>
         <p:spPr>
           <a:xfrm>
-            <a:off x="6025844" y="1420040"/>
+            <a:off x="6475166" y="1578549"/>
             <a:ext cx="836641" cy="153888"/>
           </a:xfrm>
           <a:prstGeom prst="rect">
@@ -5522,7 +5710,7 @@
         </p:nvSpPr>
         <p:spPr>
           <a:xfrm>
-            <a:off x="264742" y="877459"/>
+            <a:off x="264742" y="999857"/>
             <a:ext cx="1672529" cy="519506"/>
           </a:xfrm>
           <a:prstGeom prst="rect">
@@ -5618,7 +5806,7 @@
         </p:nvSpPr>
         <p:spPr>
           <a:xfrm>
-            <a:off x="7142787" y="1010630"/>
+            <a:off x="7129202" y="1133028"/>
             <a:ext cx="836641" cy="153888"/>
           </a:xfrm>
           <a:prstGeom prst="rect">
@@ -5698,7 +5886,7 @@
         </p:nvSpPr>
         <p:spPr>
           <a:xfrm>
-            <a:off x="3907894" y="2641641"/>
+            <a:off x="4706917" y="2882706"/>
             <a:ext cx="836641" cy="153888"/>
           </a:xfrm>
           <a:prstGeom prst="rect">
@@ -5759,6 +5947,7 @@
           </p:cNvPr>
           <p:cNvCxnSpPr>
             <a:cxnSpLocks/>
+            <a:endCxn id="36" idx="1"/>
           </p:cNvCxnSpPr>
           <p:nvPr>
             <p:custDataLst>
@@ -5767,9 +5956,9 @@
           </p:nvPr>
         </p:nvCxnSpPr>
         <p:spPr>
-          <a:xfrm>
-            <a:off x="793330" y="3505956"/>
-            <a:ext cx="1242639" cy="0"/>
+          <a:xfrm flipV="1">
+            <a:off x="793330" y="3851171"/>
+            <a:ext cx="1418652" cy="4140"/>
           </a:xfrm>
           <a:prstGeom prst="line">
             <a:avLst/>
@@ -5810,6 +5999,7 @@
           </p:cNvPr>
           <p:cNvCxnSpPr>
             <a:cxnSpLocks/>
+            <a:endCxn id="42" idx="1"/>
           </p:cNvCxnSpPr>
           <p:nvPr>
             <p:custDataLst>
@@ -5819,8 +6009,8 @@
         </p:nvCxnSpPr>
         <p:spPr>
           <a:xfrm>
-            <a:off x="792578" y="3108145"/>
-            <a:ext cx="2022060" cy="0"/>
+            <a:off x="792578" y="3406628"/>
+            <a:ext cx="2720009" cy="2538"/>
           </a:xfrm>
           <a:prstGeom prst="line">
             <a:avLst/>
@@ -5861,6 +6051,7 @@
           </p:cNvPr>
           <p:cNvCxnSpPr>
             <a:cxnSpLocks/>
+            <a:endCxn id="81" idx="1"/>
           </p:cNvCxnSpPr>
           <p:nvPr>
             <p:custDataLst>
@@ -5869,9 +6060,9 @@
           </p:nvPr>
         </p:nvCxnSpPr>
         <p:spPr>
-          <a:xfrm>
-            <a:off x="790119" y="2722525"/>
-            <a:ext cx="2648406" cy="0"/>
+          <a:xfrm flipV="1">
+            <a:off x="790119" y="2959650"/>
+            <a:ext cx="3274276" cy="3940"/>
           </a:xfrm>
           <a:prstGeom prst="line">
             <a:avLst/>
@@ -5919,8 +6110,8 @@
         </p:nvSpPr>
         <p:spPr>
           <a:xfrm>
-            <a:off x="1874225" y="3438316"/>
-            <a:ext cx="1429200" cy="127000"/>
+            <a:off x="2211982" y="3787671"/>
+            <a:ext cx="1296000" cy="127000"/>
           </a:xfrm>
           <a:prstGeom prst="roundRect">
             <a:avLst/>
@@ -5966,7 +6157,7 @@
           <a:lstStyle/>
           <a:p>
             <a:pPr algn="ctr"/>
-            <a:endParaRPr lang="en-US"/>
+            <a:endParaRPr lang="en-US" dirty="0"/>
           </a:p>
         </p:txBody>
       </p:sp>
@@ -5981,6 +6172,7 @@
           </p:cNvPr>
           <p:cNvCxnSpPr>
             <a:cxnSpLocks/>
+            <a:endCxn id="51" idx="1"/>
           </p:cNvCxnSpPr>
           <p:nvPr>
             <p:custDataLst>
@@ -5990,8 +6182,8 @@
         </p:nvCxnSpPr>
         <p:spPr>
           <a:xfrm>
-            <a:off x="831768" y="2279613"/>
-            <a:ext cx="3346625" cy="0"/>
+            <a:off x="831768" y="2531451"/>
+            <a:ext cx="3768845" cy="3475"/>
           </a:xfrm>
           <a:prstGeom prst="line">
             <a:avLst/>
@@ -6032,6 +6224,7 @@
           </p:cNvPr>
           <p:cNvCxnSpPr>
             <a:cxnSpLocks/>
+            <a:endCxn id="60" idx="1"/>
           </p:cNvCxnSpPr>
           <p:nvPr>
             <p:custDataLst>
@@ -6040,9 +6233,9 @@
           </p:nvPr>
         </p:nvCxnSpPr>
         <p:spPr>
-          <a:xfrm>
-            <a:off x="831768" y="1867657"/>
-            <a:ext cx="4034054" cy="0"/>
+          <a:xfrm flipV="1">
+            <a:off x="831768" y="2062979"/>
+            <a:ext cx="4433479" cy="4870"/>
           </a:xfrm>
           <a:prstGeom prst="line">
             <a:avLst/>
@@ -6092,7 +6285,7 @@
         </p:nvCxnSpPr>
         <p:spPr>
           <a:xfrm>
-            <a:off x="831768" y="1500783"/>
+            <a:off x="831768" y="1659292"/>
             <a:ext cx="4838782" cy="0"/>
           </a:xfrm>
           <a:prstGeom prst="line">
@@ -6143,7 +6336,7 @@
         </p:nvCxnSpPr>
         <p:spPr>
           <a:xfrm>
-            <a:off x="831768" y="1091208"/>
+            <a:off x="831768" y="1213606"/>
             <a:ext cx="6132912" cy="0"/>
           </a:xfrm>
           <a:prstGeom prst="line">
@@ -6192,8 +6385,8 @@
         </p:nvSpPr>
         <p:spPr>
           <a:xfrm>
-            <a:off x="3278225" y="2655085"/>
-            <a:ext cx="525600" cy="127000"/>
+            <a:off x="4064395" y="2896150"/>
+            <a:ext cx="540000" cy="127000"/>
           </a:xfrm>
           <a:prstGeom prst="roundRect">
             <a:avLst/>
@@ -6261,8 +6454,8 @@
         </p:nvSpPr>
         <p:spPr>
           <a:xfrm>
-            <a:off x="2648225" y="3047183"/>
-            <a:ext cx="752400" cy="127000"/>
+            <a:off x="3512587" y="3345666"/>
+            <a:ext cx="540000" cy="127000"/>
           </a:xfrm>
           <a:prstGeom prst="roundRect">
             <a:avLst/>
@@ -6330,8 +6523,8 @@
         </p:nvSpPr>
         <p:spPr>
           <a:xfrm>
-            <a:off x="4066625" y="2219588"/>
-            <a:ext cx="601200" cy="127000"/>
+            <a:off x="4600613" y="2471426"/>
+            <a:ext cx="658800" cy="127000"/>
           </a:xfrm>
           <a:prstGeom prst="roundRect">
             <a:avLst/>
@@ -6399,8 +6592,8 @@
         </p:nvSpPr>
         <p:spPr>
           <a:xfrm>
-            <a:off x="4617425" y="1810583"/>
-            <a:ext cx="378000" cy="127000"/>
+            <a:off x="5265247" y="1999479"/>
+            <a:ext cx="324000" cy="127000"/>
           </a:xfrm>
           <a:prstGeom prst="roundRect">
             <a:avLst/>
@@ -6468,8 +6661,8 @@
         </p:nvSpPr>
         <p:spPr>
           <a:xfrm>
-            <a:off x="5481425" y="1433484"/>
-            <a:ext cx="450000" cy="127000"/>
+            <a:off x="5594489" y="1591993"/>
+            <a:ext cx="810000" cy="127000"/>
           </a:xfrm>
           <a:prstGeom prst="roundRect">
             <a:avLst/>
@@ -6537,8 +6730,8 @@
         </p:nvSpPr>
         <p:spPr>
           <a:xfrm>
-            <a:off x="6421025" y="1024074"/>
-            <a:ext cx="640800" cy="127000"/>
+            <a:off x="6421025" y="1146472"/>
+            <a:ext cx="594000" cy="127000"/>
           </a:xfrm>
           <a:prstGeom prst="roundRect">
             <a:avLst/>
@@ -6590,10 +6783,10 @@
       </p:sp>
       <p:cxnSp>
         <p:nvCxnSpPr>
-          <p:cNvPr id="111" name="Connecteur droit 110">
-            <a:extLst>
-              <a:ext uri="{FF2B5EF4-FFF2-40B4-BE49-F238E27FC236}">
-                <a16:creationId xmlns:a16="http://schemas.microsoft.com/office/drawing/2014/main" id="{1D9A3AB9-6447-452A-BE2D-9C23F6BD62FC}"/>
+          <p:cNvPr id="120" name="Connecteur droit avec flèche 119">
+            <a:extLst>
+              <a:ext uri="{FF2B5EF4-FFF2-40B4-BE49-F238E27FC236}">
+                <a16:creationId xmlns:a16="http://schemas.microsoft.com/office/drawing/2014/main" id="{7D7FF50C-C698-4D95-97F2-AE352BA8D6BA}"/>
               </a:ext>
             </a:extLst>
           </p:cNvPr>
@@ -6603,56 +6796,9 @@
           <p:nvPr/>
         </p:nvCxnSpPr>
         <p:spPr>
-          <a:xfrm>
-            <a:off x="8953193" y="550419"/>
-            <a:ext cx="0" cy="5482564"/>
-          </a:xfrm>
-          <a:prstGeom prst="line">
-            <a:avLst/>
-          </a:prstGeom>
-          <a:ln>
-            <a:solidFill>
-              <a:schemeClr val="bg2">
-                <a:lumMod val="90000"/>
-                <a:alpha val="65000"/>
-              </a:schemeClr>
-            </a:solidFill>
-            <a:prstDash val="dash"/>
-          </a:ln>
-        </p:spPr>
-        <p:style>
-          <a:lnRef idx="1">
-            <a:schemeClr val="dk1"/>
-          </a:lnRef>
-          <a:fillRef idx="0">
-            <a:schemeClr val="dk1"/>
-          </a:fillRef>
-          <a:effectRef idx="0">
-            <a:schemeClr val="dk1"/>
-          </a:effectRef>
-          <a:fontRef idx="minor">
-            <a:schemeClr val="tx1"/>
-          </a:fontRef>
-        </p:style>
-      </p:cxnSp>
-      <p:cxnSp>
-        <p:nvCxnSpPr>
-          <p:cNvPr id="120" name="Connecteur droit avec flèche 119">
-            <a:extLst>
-              <a:ext uri="{FF2B5EF4-FFF2-40B4-BE49-F238E27FC236}">
-                <a16:creationId xmlns:a16="http://schemas.microsoft.com/office/drawing/2014/main" id="{7D7FF50C-C698-4D95-97F2-AE352BA8D6BA}"/>
-              </a:ext>
-            </a:extLst>
-          </p:cNvPr>
-          <p:cNvCxnSpPr>
-            <a:cxnSpLocks/>
-          </p:cNvCxnSpPr>
-          <p:nvPr/>
-        </p:nvCxnSpPr>
-        <p:spPr>
           <a:xfrm flipH="1">
-            <a:off x="8101133" y="1549412"/>
-            <a:ext cx="2274469" cy="0"/>
+            <a:off x="6975549" y="1549412"/>
+            <a:ext cx="3400054" cy="0"/>
           </a:xfrm>
           <a:prstGeom prst="straightConnector1">
             <a:avLst/>
@@ -6698,7 +6844,7 @@
         </p:nvSpPr>
         <p:spPr>
           <a:xfrm>
-            <a:off x="8726086" y="1595038"/>
+            <a:off x="8243595" y="1595038"/>
             <a:ext cx="1056567" cy="292388"/>
           </a:xfrm>
           <a:prstGeom prst="rect">
@@ -6713,13 +6859,22 @@
           <a:lstStyle/>
           <a:p>
             <a:r>
+              <a:rPr lang="fr-FR" sz="1000" spc="-4">
+                <a:solidFill>
+                  <a:schemeClr val="dk2"/>
+                </a:solidFill>
+                <a:latin typeface="Calibri" panose="020F0502020204030204" pitchFamily="34" charset="0"/>
+              </a:rPr>
+              <a:t>    Période </a:t>
+            </a:r>
+            <a:r>
               <a:rPr lang="fr-FR" sz="1000" spc="-4" dirty="0">
                 <a:solidFill>
                   <a:schemeClr val="dk2"/>
                 </a:solidFill>
                 <a:latin typeface="Calibri" panose="020F0502020204030204" pitchFamily="34" charset="0"/>
               </a:rPr>
-              <a:t>    Temps de VSR</a:t>
+              <a:t>de VSR</a:t>
             </a:r>
           </a:p>
           <a:p>
@@ -6760,7 +6915,7 @@
         </p:nvSpPr>
         <p:spPr>
           <a:xfrm>
-            <a:off x="1232431" y="4218989"/>
+            <a:off x="1403636" y="4759666"/>
             <a:ext cx="158185" cy="177800"/>
           </a:xfrm>
           <a:prstGeom prst="rect">
@@ -6822,7 +6977,7 @@
         </p:nvSpPr>
         <p:spPr>
           <a:xfrm>
-            <a:off x="1573573" y="3802675"/>
+            <a:off x="2240237" y="4284803"/>
             <a:ext cx="158185" cy="177800"/>
           </a:xfrm>
           <a:prstGeom prst="rect">
@@ -6884,7 +7039,7 @@
         </p:nvSpPr>
         <p:spPr>
           <a:xfrm>
-            <a:off x="2169712" y="3414154"/>
+            <a:off x="2706587" y="3763509"/>
             <a:ext cx="188808" cy="177800"/>
           </a:xfrm>
           <a:prstGeom prst="rect">
@@ -6946,7 +7101,7 @@
         </p:nvSpPr>
         <p:spPr>
           <a:xfrm>
-            <a:off x="2886542" y="3028629"/>
+            <a:off x="3637961" y="3327112"/>
             <a:ext cx="188808" cy="177800"/>
           </a:xfrm>
           <a:prstGeom prst="rect">
@@ -7008,7 +7163,7 @@
         </p:nvSpPr>
         <p:spPr>
           <a:xfrm>
-            <a:off x="3404850" y="2632762"/>
+            <a:off x="4221551" y="2873827"/>
             <a:ext cx="188808" cy="177800"/>
           </a:xfrm>
           <a:prstGeom prst="rect">
@@ -7070,7 +7225,7 @@
         </p:nvSpPr>
         <p:spPr>
           <a:xfrm>
-            <a:off x="4259750" y="2193217"/>
+            <a:off x="4807482" y="2445055"/>
             <a:ext cx="188808" cy="177800"/>
           </a:xfrm>
           <a:prstGeom prst="rect">
@@ -7132,7 +7287,7 @@
         </p:nvSpPr>
         <p:spPr>
           <a:xfrm>
-            <a:off x="4747932" y="1782833"/>
+            <a:off x="5300753" y="1971729"/>
             <a:ext cx="188808" cy="177800"/>
           </a:xfrm>
           <a:prstGeom prst="rect">
@@ -7194,7 +7349,7 @@
         </p:nvSpPr>
         <p:spPr>
           <a:xfrm>
-            <a:off x="5639137" y="1408084"/>
+            <a:off x="5869501" y="1566593"/>
             <a:ext cx="188808" cy="177800"/>
           </a:xfrm>
           <a:prstGeom prst="rect">
@@ -7256,7 +7411,7 @@
         </p:nvSpPr>
         <p:spPr>
           <a:xfrm>
-            <a:off x="6716499" y="998674"/>
+            <a:off x="6621909" y="1119812"/>
             <a:ext cx="188808" cy="177800"/>
           </a:xfrm>
           <a:prstGeom prst="rect">
@@ -7302,10 +7457,10 @@
       </p:sp>
       <p:sp>
         <p:nvSpPr>
-          <p:cNvPr id="146" name="OTLSHAPE_TB_00000000000000000000000000000000_TimescaleInterval1">
-            <a:extLst>
-              <a:ext uri="{FF2B5EF4-FFF2-40B4-BE49-F238E27FC236}">
-                <a16:creationId xmlns:a16="http://schemas.microsoft.com/office/drawing/2014/main" id="{A8D152F8-F935-43B9-B1D3-F5DCEFE6425F}"/>
+          <p:cNvPr id="147" name="OTLSHAPE_TB_00000000000000000000000000000000_TimescaleInterval1">
+            <a:extLst>
+              <a:ext uri="{FF2B5EF4-FFF2-40B4-BE49-F238E27FC236}">
+                <a16:creationId xmlns:a16="http://schemas.microsoft.com/office/drawing/2014/main" id="{E287EB8A-718C-420D-9C03-86FAF604FF34}"/>
               </a:ext>
             </a:extLst>
           </p:cNvPr>
@@ -7318,8 +7473,8 @@
         </p:nvSpPr>
         <p:spPr>
           <a:xfrm>
-            <a:off x="7477289" y="1144503"/>
-            <a:ext cx="188808" cy="177800"/>
+            <a:off x="8390389" y="794952"/>
+            <a:ext cx="268786" cy="177800"/>
           </a:xfrm>
           <a:prstGeom prst="rect">
             <a:avLst/>
@@ -7339,112 +7494,24 @@
                 </a:solidFill>
                 <a:latin typeface="Calibri" panose="020F0502020204030204" pitchFamily="34" charset="0"/>
               </a:rPr>
-              <a:t>70h</a:t>
-            </a:r>
-          </a:p>
-        </p:txBody>
-      </p:sp>
-      <p:sp>
-        <p:nvSpPr>
-          <p:cNvPr id="147" name="OTLSHAPE_TB_00000000000000000000000000000000_TimescaleInterval1">
-            <a:extLst>
-              <a:ext uri="{FF2B5EF4-FFF2-40B4-BE49-F238E27FC236}">
-                <a16:creationId xmlns:a16="http://schemas.microsoft.com/office/drawing/2014/main" id="{E287EB8A-718C-420D-9C03-86FAF604FF34}"/>
-              </a:ext>
-            </a:extLst>
-          </p:cNvPr>
-          <p:cNvSpPr txBox="1"/>
+              <a:t>150h</a:t>
+            </a:r>
+          </a:p>
+        </p:txBody>
+      </p:sp>
+      <p:sp>
+        <p:nvSpPr>
+          <p:cNvPr id="88" name="OTLSHAPE_M_5835b06650a246c6bed7a032fc171752_Shape">
+            <a:extLst>
+              <a:ext uri="{FF2B5EF4-FFF2-40B4-BE49-F238E27FC236}">
+                <a16:creationId xmlns:a16="http://schemas.microsoft.com/office/drawing/2014/main" id="{14E148A2-F907-419C-BD8F-0604D09B9DA9}"/>
+              </a:ext>
+            </a:extLst>
+          </p:cNvPr>
+          <p:cNvSpPr/>
           <p:nvPr>
             <p:custDataLst>
               <p:tags r:id="rId60"/>
-            </p:custDataLst>
-          </p:nvPr>
-        </p:nvSpPr>
-        <p:spPr>
-          <a:xfrm>
-            <a:off x="8390389" y="794952"/>
-            <a:ext cx="268786" cy="177800"/>
-          </a:xfrm>
-          <a:prstGeom prst="rect">
-            <a:avLst/>
-          </a:prstGeom>
-          <a:noFill/>
-        </p:spPr>
-        <p:txBody>
-          <a:bodyPr vert="horz" wrap="none" lIns="0" tIns="0" rIns="0" bIns="0" rtlCol="0" anchor="ctr" anchorCtr="0">
-            <a:noAutofit/>
-          </a:bodyPr>
-          <a:lstStyle/>
-          <a:p>
-            <a:r>
-              <a:rPr lang="en-US" sz="800" b="1" spc="-20" dirty="0">
-                <a:solidFill>
-                  <a:schemeClr val="lt1"/>
-                </a:solidFill>
-                <a:latin typeface="Calibri" panose="020F0502020204030204" pitchFamily="34" charset="0"/>
-              </a:rPr>
-              <a:t>150h</a:t>
-            </a:r>
-          </a:p>
-        </p:txBody>
-      </p:sp>
-      <p:sp>
-        <p:nvSpPr>
-          <p:cNvPr id="148" name="OTLSHAPE_TB_00000000000000000000000000000000_TimescaleInterval1">
-            <a:extLst>
-              <a:ext uri="{FF2B5EF4-FFF2-40B4-BE49-F238E27FC236}">
-                <a16:creationId xmlns:a16="http://schemas.microsoft.com/office/drawing/2014/main" id="{F3176D5B-4814-4D9B-B3D1-FE39CDBF2B2C}"/>
-              </a:ext>
-            </a:extLst>
-          </p:cNvPr>
-          <p:cNvSpPr txBox="1"/>
-          <p:nvPr>
-            <p:custDataLst>
-              <p:tags r:id="rId61"/>
-            </p:custDataLst>
-          </p:nvPr>
-        </p:nvSpPr>
-        <p:spPr>
-          <a:xfrm>
-            <a:off x="9584425" y="417843"/>
-            <a:ext cx="268786" cy="177800"/>
-          </a:xfrm>
-          <a:prstGeom prst="rect">
-            <a:avLst/>
-          </a:prstGeom>
-          <a:noFill/>
-        </p:spPr>
-        <p:txBody>
-          <a:bodyPr vert="horz" wrap="none" lIns="0" tIns="0" rIns="0" bIns="0" rtlCol="0" anchor="ctr" anchorCtr="0">
-            <a:noAutofit/>
-          </a:bodyPr>
-          <a:lstStyle/>
-          <a:p>
-            <a:r>
-              <a:rPr lang="en-US" sz="800" b="1" spc="-20" dirty="0">
-                <a:solidFill>
-                  <a:schemeClr val="lt1"/>
-                </a:solidFill>
-                <a:latin typeface="Calibri" panose="020F0502020204030204" pitchFamily="34" charset="0"/>
-              </a:rPr>
-              <a:t>150h</a:t>
-            </a:r>
-          </a:p>
-        </p:txBody>
-      </p:sp>
-      <p:sp>
-        <p:nvSpPr>
-          <p:cNvPr id="88" name="OTLSHAPE_M_5835b06650a246c6bed7a032fc171752_Shape">
-            <a:extLst>
-              <a:ext uri="{FF2B5EF4-FFF2-40B4-BE49-F238E27FC236}">
-                <a16:creationId xmlns:a16="http://schemas.microsoft.com/office/drawing/2014/main" id="{14E148A2-F907-419C-BD8F-0604D09B9DA9}"/>
-              </a:ext>
-            </a:extLst>
-          </p:cNvPr>
-          <p:cNvSpPr/>
-          <p:nvPr>
-            <p:custDataLst>
-              <p:tags r:id="rId62"/>
             </p:custDataLst>
           </p:nvPr>
         </p:nvSpPr>
@@ -7534,13 +7601,13 @@
           <p:cNvSpPr/>
           <p:nvPr>
             <p:custDataLst>
-              <p:tags r:id="rId63"/>
+              <p:tags r:id="rId61"/>
             </p:custDataLst>
           </p:nvPr>
         </p:nvSpPr>
         <p:spPr>
           <a:xfrm>
-            <a:off x="2786423" y="5917777"/>
+            <a:off x="2682821" y="5917777"/>
             <a:ext cx="152400" cy="177800"/>
           </a:xfrm>
           <a:prstGeom prst="roundRect">
@@ -7601,13 +7668,13 @@
           <p:cNvSpPr txBox="1"/>
           <p:nvPr>
             <p:custDataLst>
-              <p:tags r:id="rId64"/>
+              <p:tags r:id="rId62"/>
             </p:custDataLst>
           </p:nvPr>
         </p:nvSpPr>
         <p:spPr>
           <a:xfrm>
-            <a:off x="2705528" y="6095577"/>
+            <a:off x="2601926" y="6095577"/>
             <a:ext cx="314189" cy="186055"/>
           </a:xfrm>
           <a:prstGeom prst="rect">
@@ -7643,13 +7710,13 @@
           <p:cNvSpPr/>
           <p:nvPr>
             <p:custDataLst>
-              <p:tags r:id="rId65"/>
+              <p:tags r:id="rId63"/>
             </p:custDataLst>
           </p:nvPr>
         </p:nvSpPr>
         <p:spPr>
           <a:xfrm>
-            <a:off x="7083708" y="5951128"/>
+            <a:off x="6069942" y="5951128"/>
             <a:ext cx="152400" cy="177800"/>
           </a:xfrm>
           <a:prstGeom prst="roundRect">
@@ -7710,13 +7777,13 @@
           <p:cNvSpPr txBox="1"/>
           <p:nvPr>
             <p:custDataLst>
-              <p:tags r:id="rId66"/>
+              <p:tags r:id="rId64"/>
             </p:custDataLst>
           </p:nvPr>
         </p:nvSpPr>
         <p:spPr>
           <a:xfrm>
-            <a:off x="7002813" y="6128928"/>
+            <a:off x="5989047" y="6128928"/>
             <a:ext cx="314189" cy="186055"/>
           </a:xfrm>
           <a:prstGeom prst="rect">
@@ -7754,13 +7821,13 @@
           <p:cNvSpPr/>
           <p:nvPr>
             <p:custDataLst>
-              <p:tags r:id="rId67"/>
+              <p:tags r:id="rId65"/>
             </p:custDataLst>
           </p:nvPr>
         </p:nvSpPr>
         <p:spPr>
           <a:xfrm>
-            <a:off x="9884437" y="5951128"/>
+            <a:off x="9488940" y="5951128"/>
             <a:ext cx="152400" cy="177800"/>
           </a:xfrm>
           <a:prstGeom prst="roundRect">
@@ -7821,13 +7888,13 @@
           <p:cNvSpPr txBox="1"/>
           <p:nvPr>
             <p:custDataLst>
-              <p:tags r:id="rId68"/>
+              <p:tags r:id="rId66"/>
             </p:custDataLst>
           </p:nvPr>
         </p:nvSpPr>
         <p:spPr>
           <a:xfrm>
-            <a:off x="9803542" y="6143471"/>
+            <a:off x="9408045" y="6143471"/>
             <a:ext cx="314189" cy="186055"/>
           </a:xfrm>
           <a:prstGeom prst="rect">
@@ -7851,100 +7918,6 @@
           </a:p>
         </p:txBody>
       </p:sp>
-      <p:cxnSp>
-        <p:nvCxnSpPr>
-          <p:cNvPr id="103" name="Connecteur droit 102">
-            <a:extLst>
-              <a:ext uri="{FF2B5EF4-FFF2-40B4-BE49-F238E27FC236}">
-                <a16:creationId xmlns:a16="http://schemas.microsoft.com/office/drawing/2014/main" id="{4DDC321E-BAFA-44AE-8A43-54262E9A3224}"/>
-              </a:ext>
-            </a:extLst>
-          </p:cNvPr>
-          <p:cNvCxnSpPr>
-            <a:cxnSpLocks/>
-          </p:cNvCxnSpPr>
-          <p:nvPr/>
-        </p:nvCxnSpPr>
-        <p:spPr>
-          <a:xfrm>
-            <a:off x="2869076" y="468563"/>
-            <a:ext cx="0" cy="5482565"/>
-          </a:xfrm>
-          <a:prstGeom prst="line">
-            <a:avLst/>
-          </a:prstGeom>
-          <a:ln>
-            <a:solidFill>
-              <a:schemeClr val="bg2">
-                <a:lumMod val="90000"/>
-                <a:alpha val="65000"/>
-              </a:schemeClr>
-            </a:solidFill>
-            <a:prstDash val="dash"/>
-          </a:ln>
-        </p:spPr>
-        <p:style>
-          <a:lnRef idx="1">
-            <a:schemeClr val="dk1"/>
-          </a:lnRef>
-          <a:fillRef idx="0">
-            <a:schemeClr val="dk1"/>
-          </a:fillRef>
-          <a:effectRef idx="0">
-            <a:schemeClr val="dk1"/>
-          </a:effectRef>
-          <a:fontRef idx="minor">
-            <a:schemeClr val="tx1"/>
-          </a:fontRef>
-        </p:style>
-      </p:cxnSp>
-      <p:cxnSp>
-        <p:nvCxnSpPr>
-          <p:cNvPr id="104" name="Connecteur droit 103">
-            <a:extLst>
-              <a:ext uri="{FF2B5EF4-FFF2-40B4-BE49-F238E27FC236}">
-                <a16:creationId xmlns:a16="http://schemas.microsoft.com/office/drawing/2014/main" id="{69AF8DD6-0E11-4F35-9822-0B64CD3CD9A9}"/>
-              </a:ext>
-            </a:extLst>
-          </p:cNvPr>
-          <p:cNvCxnSpPr>
-            <a:cxnSpLocks/>
-          </p:cNvCxnSpPr>
-          <p:nvPr/>
-        </p:nvCxnSpPr>
-        <p:spPr>
-          <a:xfrm>
-            <a:off x="7163052" y="595643"/>
-            <a:ext cx="0" cy="5482565"/>
-          </a:xfrm>
-          <a:prstGeom prst="line">
-            <a:avLst/>
-          </a:prstGeom>
-          <a:ln>
-            <a:solidFill>
-              <a:schemeClr val="bg2">
-                <a:lumMod val="90000"/>
-                <a:alpha val="65000"/>
-              </a:schemeClr>
-            </a:solidFill>
-            <a:prstDash val="dash"/>
-          </a:ln>
-        </p:spPr>
-        <p:style>
-          <a:lnRef idx="1">
-            <a:schemeClr val="dk1"/>
-          </a:lnRef>
-          <a:fillRef idx="0">
-            <a:schemeClr val="dk1"/>
-          </a:fillRef>
-          <a:effectRef idx="0">
-            <a:schemeClr val="dk1"/>
-          </a:effectRef>
-          <a:fontRef idx="minor">
-            <a:schemeClr val="tx1"/>
-          </a:fontRef>
-        </p:style>
-      </p:cxnSp>
       <p:sp>
         <p:nvSpPr>
           <p:cNvPr id="105" name="OTLSHAPE_M_5835b06650a246c6bed7a032fc171752_Shape">
@@ -7957,13 +7930,13 @@
           <p:cNvSpPr/>
           <p:nvPr>
             <p:custDataLst>
-              <p:tags r:id="rId69"/>
+              <p:tags r:id="rId67"/>
             </p:custDataLst>
           </p:nvPr>
         </p:nvSpPr>
         <p:spPr>
           <a:xfrm>
-            <a:off x="7963691" y="5554014"/>
+            <a:off x="6826088" y="5554014"/>
             <a:ext cx="258659" cy="287399"/>
           </a:xfrm>
           <a:prstGeom prst="star5">
@@ -8047,13 +8020,13 @@
           <p:cNvSpPr txBox="1"/>
           <p:nvPr>
             <p:custDataLst>
-              <p:tags r:id="rId70"/>
+              <p:tags r:id="rId68"/>
             </p:custDataLst>
           </p:nvPr>
         </p:nvSpPr>
         <p:spPr>
           <a:xfrm>
-            <a:off x="7749024" y="5193799"/>
+            <a:off x="6611421" y="5193799"/>
             <a:ext cx="805717" cy="184666"/>
           </a:xfrm>
           <a:prstGeom prst="rect">
@@ -8107,13 +8080,13 @@
           <p:cNvSpPr txBox="1"/>
           <p:nvPr>
             <p:custDataLst>
-              <p:tags r:id="rId71"/>
+              <p:tags r:id="rId69"/>
             </p:custDataLst>
           </p:nvPr>
         </p:nvSpPr>
         <p:spPr>
           <a:xfrm>
-            <a:off x="7796462" y="5376905"/>
+            <a:off x="6658859" y="5376905"/>
             <a:ext cx="805717" cy="153888"/>
           </a:xfrm>
           <a:prstGeom prst="rect">
@@ -8231,6 +8204,545 @@
                 <a:cs typeface="Segoe UI Light" panose="020B0502040204020203" pitchFamily="34" charset="0"/>
               </a:rPr>
               <a:t> – Migration de l’architecture</a:t>
+            </a:r>
+          </a:p>
+        </p:txBody>
+      </p:sp>
+      <p:cxnSp>
+        <p:nvCxnSpPr>
+          <p:cNvPr id="28" name="Connecteur droit 27">
+            <a:extLst>
+              <a:ext uri="{FF2B5EF4-FFF2-40B4-BE49-F238E27FC236}">
+                <a16:creationId xmlns:a16="http://schemas.microsoft.com/office/drawing/2014/main" id="{AAA0A67D-9E0F-4C43-808A-A386BA6ECC98}"/>
+              </a:ext>
+            </a:extLst>
+          </p:cNvPr>
+          <p:cNvCxnSpPr>
+            <a:cxnSpLocks/>
+          </p:cNvCxnSpPr>
+          <p:nvPr/>
+        </p:nvCxnSpPr>
+        <p:spPr>
+          <a:xfrm flipV="1">
+            <a:off x="4361307" y="5494619"/>
+            <a:ext cx="29554" cy="8859"/>
+          </a:xfrm>
+          <a:prstGeom prst="line">
+            <a:avLst/>
+          </a:prstGeom>
+        </p:spPr>
+        <p:style>
+          <a:lnRef idx="1">
+            <a:schemeClr val="accent1"/>
+          </a:lnRef>
+          <a:fillRef idx="0">
+            <a:schemeClr val="accent1"/>
+          </a:fillRef>
+          <a:effectRef idx="0">
+            <a:schemeClr val="accent1"/>
+          </a:effectRef>
+          <a:fontRef idx="minor">
+            <a:schemeClr val="tx1"/>
+          </a:fontRef>
+        </p:style>
+      </p:cxnSp>
+      <p:cxnSp>
+        <p:nvCxnSpPr>
+          <p:cNvPr id="149" name="Connecteur droit 148">
+            <a:extLst>
+              <a:ext uri="{FF2B5EF4-FFF2-40B4-BE49-F238E27FC236}">
+                <a16:creationId xmlns:a16="http://schemas.microsoft.com/office/drawing/2014/main" id="{E664874C-7BD6-40B5-B736-C8E519C7799D}"/>
+              </a:ext>
+            </a:extLst>
+          </p:cNvPr>
+          <p:cNvCxnSpPr>
+            <a:cxnSpLocks/>
+          </p:cNvCxnSpPr>
+          <p:nvPr/>
+        </p:nvCxnSpPr>
+        <p:spPr>
+          <a:xfrm>
+            <a:off x="5609866" y="933374"/>
+            <a:ext cx="0" cy="4922974"/>
+          </a:xfrm>
+          <a:prstGeom prst="line">
+            <a:avLst/>
+          </a:prstGeom>
+          <a:ln>
+            <a:solidFill>
+              <a:srgbClr val="9A1E1E">
+                <a:alpha val="70000"/>
+              </a:srgbClr>
+            </a:solidFill>
+            <a:prstDash val="dashDot"/>
+          </a:ln>
+        </p:spPr>
+        <p:style>
+          <a:lnRef idx="1">
+            <a:schemeClr val="accent1"/>
+          </a:lnRef>
+          <a:fillRef idx="0">
+            <a:schemeClr val="accent1"/>
+          </a:fillRef>
+          <a:effectRef idx="0">
+            <a:schemeClr val="accent1"/>
+          </a:effectRef>
+          <a:fontRef idx="minor">
+            <a:schemeClr val="tx1"/>
+          </a:fontRef>
+        </p:style>
+      </p:cxnSp>
+      <p:sp>
+        <p:nvSpPr>
+          <p:cNvPr id="150" name="OTLSHAPE_M_5835b06650a246c6bed7a032fc171752_Shape">
+            <a:extLst>
+              <a:ext uri="{FF2B5EF4-FFF2-40B4-BE49-F238E27FC236}">
+                <a16:creationId xmlns:a16="http://schemas.microsoft.com/office/drawing/2014/main" id="{606DFEF5-CEB9-4857-8732-D4567BD4268F}"/>
+              </a:ext>
+            </a:extLst>
+          </p:cNvPr>
+          <p:cNvSpPr/>
+          <p:nvPr>
+            <p:custDataLst>
+              <p:tags r:id="rId70"/>
+            </p:custDataLst>
+          </p:nvPr>
+        </p:nvSpPr>
+        <p:spPr>
+          <a:xfrm>
+            <a:off x="5472424" y="5554014"/>
+            <a:ext cx="258659" cy="287399"/>
+          </a:xfrm>
+          <a:prstGeom prst="star5">
+            <a:avLst>
+              <a:gd name="adj" fmla="val 25000"/>
+              <a:gd name="hf" fmla="val 105146"/>
+              <a:gd name="vf" fmla="val 110557"/>
+            </a:avLst>
+          </a:prstGeom>
+          <a:solidFill>
+            <a:srgbClr val="DF2125"/>
+          </a:solidFill>
+          <a:ln w="12700" cap="flat" cmpd="sng" algn="ctr">
+            <a:noFill/>
+            <a:prstDash val="solid"/>
+            <a:miter lim="800000"/>
+          </a:ln>
+          <a:effectLst/>
+          <a:extLst>
+            <a:ext uri="{91240B29-F687-4F45-9708-019B960494DF}">
+              <a14:hiddenLine xmlns:a14="http://schemas.microsoft.com/office/drawing/2010/main" w="12700" cap="flat" cmpd="sng" algn="ctr">
+                <a:solidFill>
+                  <a:schemeClr val="accent1">
+                    <a:shade val="50000"/>
+                  </a:schemeClr>
+                </a:solidFill>
+                <a:prstDash val="solid"/>
+                <a:miter lim="800000"/>
+              </a14:hiddenLine>
+            </a:ext>
+            <a:ext uri="{AF507438-7753-43E0-B8FC-AC1667EBCBE1}">
+              <a14:hiddenEffects xmlns:a14="http://schemas.microsoft.com/office/drawing/2010/main">
+                <a:effectLst>
+                  <a:outerShdw>
+                    <a:scrgbClr r="0" g="0" b="0">
+                      <a:alpha val="50000"/>
+                    </a:scrgbClr>
+                  </a:outerShdw>
+                </a:effectLst>
+              </a14:hiddenEffects>
+            </a:ext>
+            <a:ext uri="{53640926-AAD7-44D8-BBD7-CCE9431645EC}">
+              <a14:shadowObscured xmlns:a14="http://schemas.microsoft.com/office/drawing/2010/main" val="1"/>
+            </a:ext>
+          </a:extLst>
+        </p:spPr>
+        <p:style>
+          <a:lnRef idx="2">
+            <a:schemeClr val="accent1">
+              <a:shade val="50000"/>
+            </a:schemeClr>
+          </a:lnRef>
+          <a:fillRef idx="1">
+            <a:schemeClr val="accent1"/>
+          </a:fillRef>
+          <a:effectRef idx="0">
+            <a:schemeClr val="accent1"/>
+          </a:effectRef>
+          <a:fontRef idx="minor">
+            <a:schemeClr val="lt1"/>
+          </a:fontRef>
+        </p:style>
+        <p:txBody>
+          <a:bodyPr rtlCol="0" anchor="ctr"/>
+          <a:lstStyle/>
+          <a:p>
+            <a:pPr algn="ctr"/>
+            <a:endParaRPr lang="en-US" dirty="0"/>
+          </a:p>
+        </p:txBody>
+      </p:sp>
+      <p:sp>
+        <p:nvSpPr>
+          <p:cNvPr id="151" name="OTLSHAPE_M_5835b06650a246c6bed7a032fc171752_Title">
+            <a:extLst>
+              <a:ext uri="{FF2B5EF4-FFF2-40B4-BE49-F238E27FC236}">
+                <a16:creationId xmlns:a16="http://schemas.microsoft.com/office/drawing/2014/main" id="{83F15E9E-9A57-497F-86D3-EC9E41223E73}"/>
+              </a:ext>
+            </a:extLst>
+          </p:cNvPr>
+          <p:cNvSpPr txBox="1"/>
+          <p:nvPr>
+            <p:custDataLst>
+              <p:tags r:id="rId71"/>
+            </p:custDataLst>
+          </p:nvPr>
+        </p:nvSpPr>
+        <p:spPr>
+          <a:xfrm>
+            <a:off x="4734858" y="5193799"/>
+            <a:ext cx="1736494" cy="184666"/>
+          </a:xfrm>
+          <a:prstGeom prst="rect">
+            <a:avLst/>
+          </a:prstGeom>
+          <a:noFill/>
+        </p:spPr>
+        <p:txBody>
+          <a:bodyPr vert="horz" wrap="square" lIns="0" tIns="0" rIns="0" bIns="0" rtlCol="0" anchor="ctr" anchorCtr="0">
+            <a:spAutoFit/>
+          </a:bodyPr>
+          <a:lstStyle/>
+          <a:p>
+            <a:pPr algn="ctr"/>
+            <a:r>
+              <a:rPr lang="en-US" sz="1200" spc="-10" dirty="0">
+                <a:solidFill>
+                  <a:schemeClr val="dk1"/>
+                </a:solidFill>
+                <a:latin typeface="Calibri" panose="020F0502020204030204" pitchFamily="34" charset="0"/>
+              </a:rPr>
+              <a:t>Mise </a:t>
+            </a:r>
+            <a:r>
+              <a:rPr lang="en-US" sz="1200" spc="-10" dirty="0" err="1">
+                <a:solidFill>
+                  <a:schemeClr val="dk1"/>
+                </a:solidFill>
+                <a:latin typeface="Calibri" panose="020F0502020204030204" pitchFamily="34" charset="0"/>
+              </a:rPr>
+              <a:t>en</a:t>
+            </a:r>
+            <a:r>
+              <a:rPr lang="en-US" sz="1200" spc="-10" dirty="0">
+                <a:solidFill>
+                  <a:schemeClr val="dk1"/>
+                </a:solidFill>
+                <a:latin typeface="Calibri" panose="020F0502020204030204" pitchFamily="34" charset="0"/>
+              </a:rPr>
+              <a:t> production</a:t>
+            </a:r>
+          </a:p>
+        </p:txBody>
+      </p:sp>
+      <p:sp>
+        <p:nvSpPr>
+          <p:cNvPr id="152" name="OTLSHAPE_M_12e4f27701a648b8890bd3723f98955d_Date">
+            <a:extLst>
+              <a:ext uri="{FF2B5EF4-FFF2-40B4-BE49-F238E27FC236}">
+                <a16:creationId xmlns:a16="http://schemas.microsoft.com/office/drawing/2014/main" id="{14D1BF84-EFBC-4B4E-9641-1F2AD04CD025}"/>
+              </a:ext>
+            </a:extLst>
+          </p:cNvPr>
+          <p:cNvSpPr txBox="1"/>
+          <p:nvPr>
+            <p:custDataLst>
+              <p:tags r:id="rId72"/>
+            </p:custDataLst>
+          </p:nvPr>
+        </p:nvSpPr>
+        <p:spPr>
+          <a:xfrm>
+            <a:off x="5256815" y="5376905"/>
+            <a:ext cx="805717" cy="153888"/>
+          </a:xfrm>
+          <a:prstGeom prst="rect">
+            <a:avLst/>
+          </a:prstGeom>
+          <a:noFill/>
+        </p:spPr>
+        <p:txBody>
+          <a:bodyPr vert="horz" wrap="square" lIns="0" tIns="0" rIns="0" bIns="0" rtlCol="0" anchor="ctr" anchorCtr="0">
+            <a:spAutoFit/>
+          </a:bodyPr>
+          <a:lstStyle/>
+          <a:p>
+            <a:r>
+              <a:rPr lang="en-US" sz="1000" spc="-6" dirty="0">
+                <a:solidFill>
+                  <a:schemeClr val="dk2"/>
+                </a:solidFill>
+                <a:latin typeface="Calibri" panose="020F0502020204030204" pitchFamily="34" charset="0"/>
+              </a:rPr>
+              <a:t> 21 </a:t>
+            </a:r>
+            <a:r>
+              <a:rPr lang="en-US" sz="1000" spc="-6" dirty="0" err="1">
+                <a:solidFill>
+                  <a:schemeClr val="dk2"/>
+                </a:solidFill>
+                <a:latin typeface="Calibri" panose="020F0502020204030204" pitchFamily="34" charset="0"/>
+              </a:rPr>
+              <a:t>Juin</a:t>
+            </a:r>
+            <a:r>
+              <a:rPr lang="en-US" sz="1000" spc="-6" dirty="0">
+                <a:solidFill>
+                  <a:schemeClr val="dk2"/>
+                </a:solidFill>
+                <a:latin typeface="Calibri" panose="020F0502020204030204" pitchFamily="34" charset="0"/>
+              </a:rPr>
+              <a:t> 2022</a:t>
+            </a:r>
+          </a:p>
+        </p:txBody>
+      </p:sp>
+      <p:cxnSp>
+        <p:nvCxnSpPr>
+          <p:cNvPr id="154" name="Connecteur droit 153">
+            <a:extLst>
+              <a:ext uri="{FF2B5EF4-FFF2-40B4-BE49-F238E27FC236}">
+                <a16:creationId xmlns:a16="http://schemas.microsoft.com/office/drawing/2014/main" id="{6293C64C-233D-4CC0-94B2-309B88AD353C}"/>
+              </a:ext>
+            </a:extLst>
+          </p:cNvPr>
+          <p:cNvCxnSpPr>
+            <a:cxnSpLocks/>
+          </p:cNvCxnSpPr>
+          <p:nvPr/>
+        </p:nvCxnSpPr>
+        <p:spPr>
+          <a:xfrm>
+            <a:off x="3814613" y="949522"/>
+            <a:ext cx="0" cy="4922974"/>
+          </a:xfrm>
+          <a:prstGeom prst="line">
+            <a:avLst/>
+          </a:prstGeom>
+          <a:ln>
+            <a:solidFill>
+              <a:srgbClr val="9A1E1E">
+                <a:alpha val="70000"/>
+              </a:srgbClr>
+            </a:solidFill>
+            <a:prstDash val="dashDot"/>
+          </a:ln>
+        </p:spPr>
+        <p:style>
+          <a:lnRef idx="1">
+            <a:schemeClr val="accent1"/>
+          </a:lnRef>
+          <a:fillRef idx="0">
+            <a:schemeClr val="accent1"/>
+          </a:fillRef>
+          <a:effectRef idx="0">
+            <a:schemeClr val="accent1"/>
+          </a:effectRef>
+          <a:fontRef idx="minor">
+            <a:schemeClr val="tx1"/>
+          </a:fontRef>
+        </p:style>
+      </p:cxnSp>
+      <p:sp>
+        <p:nvSpPr>
+          <p:cNvPr id="155" name="OTLSHAPE_M_5835b06650a246c6bed7a032fc171752_Shape">
+            <a:extLst>
+              <a:ext uri="{FF2B5EF4-FFF2-40B4-BE49-F238E27FC236}">
+                <a16:creationId xmlns:a16="http://schemas.microsoft.com/office/drawing/2014/main" id="{43365F68-1805-4C9B-B339-ADBC09938525}"/>
+              </a:ext>
+            </a:extLst>
+          </p:cNvPr>
+          <p:cNvSpPr/>
+          <p:nvPr>
+            <p:custDataLst>
+              <p:tags r:id="rId73"/>
+            </p:custDataLst>
+          </p:nvPr>
+        </p:nvSpPr>
+        <p:spPr>
+          <a:xfrm>
+            <a:off x="3677171" y="5570162"/>
+            <a:ext cx="258659" cy="287399"/>
+          </a:xfrm>
+          <a:prstGeom prst="star5">
+            <a:avLst>
+              <a:gd name="adj" fmla="val 25000"/>
+              <a:gd name="hf" fmla="val 105146"/>
+              <a:gd name="vf" fmla="val 110557"/>
+            </a:avLst>
+          </a:prstGeom>
+          <a:solidFill>
+            <a:srgbClr val="DF2125"/>
+          </a:solidFill>
+          <a:ln w="12700" cap="flat" cmpd="sng" algn="ctr">
+            <a:noFill/>
+            <a:prstDash val="solid"/>
+            <a:miter lim="800000"/>
+          </a:ln>
+          <a:effectLst/>
+          <a:extLst>
+            <a:ext uri="{91240B29-F687-4F45-9708-019B960494DF}">
+              <a14:hiddenLine xmlns:a14="http://schemas.microsoft.com/office/drawing/2010/main" w="12700" cap="flat" cmpd="sng" algn="ctr">
+                <a:solidFill>
+                  <a:schemeClr val="accent1">
+                    <a:shade val="50000"/>
+                  </a:schemeClr>
+                </a:solidFill>
+                <a:prstDash val="solid"/>
+                <a:miter lim="800000"/>
+              </a14:hiddenLine>
+            </a:ext>
+            <a:ext uri="{AF507438-7753-43E0-B8FC-AC1667EBCBE1}">
+              <a14:hiddenEffects xmlns:a14="http://schemas.microsoft.com/office/drawing/2010/main">
+                <a:effectLst>
+                  <a:outerShdw>
+                    <a:scrgbClr r="0" g="0" b="0">
+                      <a:alpha val="50000"/>
+                    </a:scrgbClr>
+                  </a:outerShdw>
+                </a:effectLst>
+              </a14:hiddenEffects>
+            </a:ext>
+            <a:ext uri="{53640926-AAD7-44D8-BBD7-CCE9431645EC}">
+              <a14:shadowObscured xmlns:a14="http://schemas.microsoft.com/office/drawing/2010/main" val="1"/>
+            </a:ext>
+          </a:extLst>
+        </p:spPr>
+        <p:style>
+          <a:lnRef idx="2">
+            <a:schemeClr val="accent1">
+              <a:shade val="50000"/>
+            </a:schemeClr>
+          </a:lnRef>
+          <a:fillRef idx="1">
+            <a:schemeClr val="accent1"/>
+          </a:fillRef>
+          <a:effectRef idx="0">
+            <a:schemeClr val="accent1"/>
+          </a:effectRef>
+          <a:fontRef idx="minor">
+            <a:schemeClr val="lt1"/>
+          </a:fontRef>
+        </p:style>
+        <p:txBody>
+          <a:bodyPr rtlCol="0" anchor="ctr"/>
+          <a:lstStyle/>
+          <a:p>
+            <a:pPr algn="ctr"/>
+            <a:endParaRPr lang="en-US" dirty="0"/>
+          </a:p>
+        </p:txBody>
+      </p:sp>
+      <p:sp>
+        <p:nvSpPr>
+          <p:cNvPr id="156" name="OTLSHAPE_M_5835b06650a246c6bed7a032fc171752_Title">
+            <a:extLst>
+              <a:ext uri="{FF2B5EF4-FFF2-40B4-BE49-F238E27FC236}">
+                <a16:creationId xmlns:a16="http://schemas.microsoft.com/office/drawing/2014/main" id="{F2A08653-9DFA-4779-9F5E-58BFCF85A0F1}"/>
+              </a:ext>
+            </a:extLst>
+          </p:cNvPr>
+          <p:cNvSpPr txBox="1"/>
+          <p:nvPr>
+            <p:custDataLst>
+              <p:tags r:id="rId74"/>
+            </p:custDataLst>
+          </p:nvPr>
+        </p:nvSpPr>
+        <p:spPr>
+          <a:xfrm>
+            <a:off x="2939605" y="5209947"/>
+            <a:ext cx="1736494" cy="184666"/>
+          </a:xfrm>
+          <a:prstGeom prst="rect">
+            <a:avLst/>
+          </a:prstGeom>
+          <a:noFill/>
+        </p:spPr>
+        <p:txBody>
+          <a:bodyPr vert="horz" wrap="square" lIns="0" tIns="0" rIns="0" bIns="0" rtlCol="0" anchor="ctr" anchorCtr="0">
+            <a:spAutoFit/>
+          </a:bodyPr>
+          <a:lstStyle/>
+          <a:p>
+            <a:pPr algn="ctr"/>
+            <a:r>
+              <a:rPr lang="en-US" sz="1200" spc="-10" dirty="0">
+                <a:solidFill>
+                  <a:schemeClr val="dk1"/>
+                </a:solidFill>
+                <a:latin typeface="Calibri" panose="020F0502020204030204" pitchFamily="34" charset="0"/>
+              </a:rPr>
+              <a:t>Bascule à </a:t>
+            </a:r>
+            <a:r>
+              <a:rPr lang="en-US" sz="1200" spc="-10" dirty="0" err="1">
+                <a:solidFill>
+                  <a:schemeClr val="dk1"/>
+                </a:solidFill>
+                <a:latin typeface="Calibri" panose="020F0502020204030204" pitchFamily="34" charset="0"/>
+              </a:rPr>
+              <a:t>blanc</a:t>
+            </a:r>
+            <a:endParaRPr lang="en-US" sz="1200" spc="-10" dirty="0">
+              <a:solidFill>
+                <a:schemeClr val="dk1"/>
+              </a:solidFill>
+              <a:latin typeface="Calibri" panose="020F0502020204030204" pitchFamily="34" charset="0"/>
+            </a:endParaRPr>
+          </a:p>
+        </p:txBody>
+      </p:sp>
+      <p:sp>
+        <p:nvSpPr>
+          <p:cNvPr id="157" name="OTLSHAPE_M_12e4f27701a648b8890bd3723f98955d_Date">
+            <a:extLst>
+              <a:ext uri="{FF2B5EF4-FFF2-40B4-BE49-F238E27FC236}">
+                <a16:creationId xmlns:a16="http://schemas.microsoft.com/office/drawing/2014/main" id="{D9C5B546-20D9-4E8C-B1B1-AD44EE143068}"/>
+              </a:ext>
+            </a:extLst>
+          </p:cNvPr>
+          <p:cNvSpPr txBox="1"/>
+          <p:nvPr>
+            <p:custDataLst>
+              <p:tags r:id="rId75"/>
+            </p:custDataLst>
+          </p:nvPr>
+        </p:nvSpPr>
+        <p:spPr>
+          <a:xfrm>
+            <a:off x="3461562" y="5393053"/>
+            <a:ext cx="805717" cy="153888"/>
+          </a:xfrm>
+          <a:prstGeom prst="rect">
+            <a:avLst/>
+          </a:prstGeom>
+          <a:noFill/>
+        </p:spPr>
+        <p:txBody>
+          <a:bodyPr vert="horz" wrap="square" lIns="0" tIns="0" rIns="0" bIns="0" rtlCol="0" anchor="ctr" anchorCtr="0">
+            <a:spAutoFit/>
+          </a:bodyPr>
+          <a:lstStyle/>
+          <a:p>
+            <a:r>
+              <a:rPr lang="en-US" sz="1000" spc="-6" dirty="0">
+                <a:solidFill>
+                  <a:schemeClr val="dk2"/>
+                </a:solidFill>
+                <a:latin typeface="Calibri" panose="020F0502020204030204" pitchFamily="34" charset="0"/>
+              </a:rPr>
+              <a:t> 22 Mai 2022</a:t>
             </a:r>
           </a:p>
         </p:txBody>
@@ -8785,18 +9297,6 @@
 
 <file path=ppt/tags/tag60.xml><?xml version="1.0" encoding="utf-8"?>
 <p:tagLst xmlns:a="http://schemas.openxmlformats.org/drawingml/2006/main" xmlns:r="http://schemas.openxmlformats.org/officeDocument/2006/relationships" xmlns:p="http://schemas.openxmlformats.org/presentationml/2006/main">
-  <p:tag name="OTLMARKERSHAPE" val="OTL"/>
-</p:tagLst>
-</file>
-
-<file path=ppt/tags/tag61.xml><?xml version="1.0" encoding="utf-8"?>
-<p:tagLst xmlns:a="http://schemas.openxmlformats.org/drawingml/2006/main" xmlns:r="http://schemas.openxmlformats.org/officeDocument/2006/relationships" xmlns:p="http://schemas.openxmlformats.org/presentationml/2006/main">
-  <p:tag name="OTLMARKERSHAPE" val="OTL"/>
-</p:tagLst>
-</file>
-
-<file path=ppt/tags/tag62.xml><?xml version="1.0" encoding="utf-8"?>
-<p:tagLst xmlns:a="http://schemas.openxmlformats.org/drawingml/2006/main" xmlns:r="http://schemas.openxmlformats.org/officeDocument/2006/relationships" xmlns:p="http://schemas.openxmlformats.org/presentationml/2006/main">
   <p:tag name="OTLDATEFORMATSTRING" val="MMM d"/>
   <p:tag name="OTLDATEFORMATSEPARATOR" val="/"/>
   <p:tag name="OTLDATEFORMATUSEUS" val="True"/>
@@ -8811,6 +9311,32 @@
   <p:tag name="OTLWEEKNUMBERINGFORMAT" val="WNFormat1"/>
   <p:tag name="OTLWEEKNUMBERINGISVISIBLE" val="False"/>
   <p:tag name="OTLDATE" val="2021-11-30T23:59:00.0000000"/>
+  <p:tag name="OTLMARKERSHAPE" val="OTL"/>
+</p:tagLst>
+</file>
+
+<file path=ppt/tags/tag61.xml><?xml version="1.0" encoding="utf-8"?>
+<p:tagLst xmlns:a="http://schemas.openxmlformats.org/drawingml/2006/main" xmlns:r="http://schemas.openxmlformats.org/officeDocument/2006/relationships" xmlns:p="http://schemas.openxmlformats.org/presentationml/2006/main">
+  <p:tag name="OTLDATEFORMATSTRING" val="MMM d"/>
+  <p:tag name="OTLDATEFORMATSEPARATOR" val="/"/>
+  <p:tag name="OTLDATEFORMATUSEUS" val="True"/>
+  <p:tag name="OTLDATEFORMATDATEISVISIBLE" val="True"/>
+  <p:tag name="OTLDATEFORMATTIMEISVISIBLE" val="False"/>
+  <p:tag name="OTLDATEFORMATAMPMDESIGNATOR" val="AmPmLowerCase"/>
+  <p:tag name="OTLDATEFORMATHOURDIGITS" val="H"/>
+  <p:tag name="OTLDATEFORMATTRIM00MINUTES" val="False"/>
+  <p:tag name="OTLMTITLE" val="Course plan approved"/>
+  <p:tag name="OTLPOSITIONONTASK" val="None"/>
+  <p:tag name="OTLRELATEDTASKID" val="00000000-0000-0000-0000-000000000000"/>
+  <p:tag name="OTLWEEKNUMBERINGFORMAT" val="WNFormat1"/>
+  <p:tag name="OTLWEEKNUMBERINGISVISIBLE" val="False"/>
+  <p:tag name="OTLDATE" val="2021-07-30T23:59:00.0000000"/>
+  <p:tag name="OTLMARKERSHAPE" val="OTL"/>
+</p:tagLst>
+</file>
+
+<file path=ppt/tags/tag62.xml><?xml version="1.0" encoding="utf-8"?>
+<p:tagLst xmlns:a="http://schemas.openxmlformats.org/drawingml/2006/main" xmlns:r="http://schemas.openxmlformats.org/officeDocument/2006/relationships" xmlns:p="http://schemas.openxmlformats.org/presentationml/2006/main">
   <p:tag name="OTLMARKERSHAPE" val="OTL"/>
 </p:tagLst>
 </file>
@@ -8877,12 +9403,12 @@
   <p:tag name="OTLDATEFORMATAMPMDESIGNATOR" val="AmPmLowerCase"/>
   <p:tag name="OTLDATEFORMATHOURDIGITS" val="H"/>
   <p:tag name="OTLDATEFORMATTRIM00MINUTES" val="False"/>
-  <p:tag name="OTLMTITLE" val="Course plan approved"/>
+  <p:tag name="OTLMTITLE" val="Launch"/>
   <p:tag name="OTLPOSITIONONTASK" val="None"/>
   <p:tag name="OTLRELATEDTASKID" val="00000000-0000-0000-0000-000000000000"/>
   <p:tag name="OTLWEEKNUMBERINGFORMAT" val="WNFormat1"/>
   <p:tag name="OTLWEEKNUMBERINGISVISIBLE" val="False"/>
-  <p:tag name="OTLDATE" val="2021-07-30T23:59:00.0000000"/>
+  <p:tag name="OTLDATE" val="2021-11-30T23:59:00.0000000"/>
   <p:tag name="OTLMARKERSHAPE" val="OTL"/>
 </p:tagLst>
 </file>
@@ -8894,6 +9420,18 @@
 </file>
 
 <file path=ppt/tags/tag69.xml><?xml version="1.0" encoding="utf-8"?>
+<p:tagLst xmlns:a="http://schemas.openxmlformats.org/drawingml/2006/main" xmlns:r="http://schemas.openxmlformats.org/officeDocument/2006/relationships" xmlns:p="http://schemas.openxmlformats.org/presentationml/2006/main">
+  <p:tag name="OTLMARKERSHAPE" val="OTL"/>
+</p:tagLst>
+</file>
+
+<file path=ppt/tags/tag7.xml><?xml version="1.0" encoding="utf-8"?>
+<p:tagLst xmlns:a="http://schemas.openxmlformats.org/drawingml/2006/main" xmlns:r="http://schemas.openxmlformats.org/officeDocument/2006/relationships" xmlns:p="http://schemas.openxmlformats.org/presentationml/2006/main">
+  <p:tag name="OTLMARKERSHAPE" val="OTL"/>
+</p:tagLst>
+</file>
+
+<file path=ppt/tags/tag70.xml><?xml version="1.0" encoding="utf-8"?>
 <p:tagLst xmlns:a="http://schemas.openxmlformats.org/drawingml/2006/main" xmlns:r="http://schemas.openxmlformats.org/officeDocument/2006/relationships" xmlns:p="http://schemas.openxmlformats.org/presentationml/2006/main">
   <p:tag name="OTLDATEFORMATSTRING" val="MMM d"/>
   <p:tag name="OTLDATEFORMATSEPARATOR" val="/"/>
@@ -8913,19 +9451,45 @@
 </p:tagLst>
 </file>
 
-<file path=ppt/tags/tag7.xml><?xml version="1.0" encoding="utf-8"?>
+<file path=ppt/tags/tag71.xml><?xml version="1.0" encoding="utf-8"?>
 <p:tagLst xmlns:a="http://schemas.openxmlformats.org/drawingml/2006/main" xmlns:r="http://schemas.openxmlformats.org/officeDocument/2006/relationships" xmlns:p="http://schemas.openxmlformats.org/presentationml/2006/main">
   <p:tag name="OTLMARKERSHAPE" val="OTL"/>
 </p:tagLst>
 </file>
 
-<file path=ppt/tags/tag70.xml><?xml version="1.0" encoding="utf-8"?>
+<file path=ppt/tags/tag72.xml><?xml version="1.0" encoding="utf-8"?>
 <p:tagLst xmlns:a="http://schemas.openxmlformats.org/drawingml/2006/main" xmlns:r="http://schemas.openxmlformats.org/officeDocument/2006/relationships" xmlns:p="http://schemas.openxmlformats.org/presentationml/2006/main">
   <p:tag name="OTLMARKERSHAPE" val="OTL"/>
 </p:tagLst>
 </file>
 
-<file path=ppt/tags/tag71.xml><?xml version="1.0" encoding="utf-8"?>
+<file path=ppt/tags/tag73.xml><?xml version="1.0" encoding="utf-8"?>
+<p:tagLst xmlns:a="http://schemas.openxmlformats.org/drawingml/2006/main" xmlns:r="http://schemas.openxmlformats.org/officeDocument/2006/relationships" xmlns:p="http://schemas.openxmlformats.org/presentationml/2006/main">
+  <p:tag name="OTLDATEFORMATSTRING" val="MMM d"/>
+  <p:tag name="OTLDATEFORMATSEPARATOR" val="/"/>
+  <p:tag name="OTLDATEFORMATUSEUS" val="True"/>
+  <p:tag name="OTLDATEFORMATDATEISVISIBLE" val="True"/>
+  <p:tag name="OTLDATEFORMATTIMEISVISIBLE" val="False"/>
+  <p:tag name="OTLDATEFORMATAMPMDESIGNATOR" val="AmPmLowerCase"/>
+  <p:tag name="OTLDATEFORMATHOURDIGITS" val="H"/>
+  <p:tag name="OTLDATEFORMATTRIM00MINUTES" val="False"/>
+  <p:tag name="OTLMTITLE" val="Launch"/>
+  <p:tag name="OTLPOSITIONONTASK" val="None"/>
+  <p:tag name="OTLRELATEDTASKID" val="00000000-0000-0000-0000-000000000000"/>
+  <p:tag name="OTLWEEKNUMBERINGFORMAT" val="WNFormat1"/>
+  <p:tag name="OTLWEEKNUMBERINGISVISIBLE" val="False"/>
+  <p:tag name="OTLDATE" val="2021-11-30T23:59:00.0000000"/>
+  <p:tag name="OTLMARKERSHAPE" val="OTL"/>
+</p:tagLst>
+</file>
+
+<file path=ppt/tags/tag74.xml><?xml version="1.0" encoding="utf-8"?>
+<p:tagLst xmlns:a="http://schemas.openxmlformats.org/drawingml/2006/main" xmlns:r="http://schemas.openxmlformats.org/officeDocument/2006/relationships" xmlns:p="http://schemas.openxmlformats.org/presentationml/2006/main">
+  <p:tag name="OTLMARKERSHAPE" val="OTL"/>
+</p:tagLst>
+</file>
+
+<file path=ppt/tags/tag75.xml><?xml version="1.0" encoding="utf-8"?>
 <p:tagLst xmlns:a="http://schemas.openxmlformats.org/drawingml/2006/main" xmlns:r="http://schemas.openxmlformats.org/officeDocument/2006/relationships" xmlns:p="http://schemas.openxmlformats.org/presentationml/2006/main">
   <p:tag name="OTLMARKERSHAPE" val="OTL"/>
 </p:tagLst>

</xml_diff>